<commit_message>
Added the 2015 St. Louis Presentation Application.docx and updated the presentation.
</commit_message>
<xml_diff>
--- a/ChaprSVN/Promo/Chap Research 2015 Kickoff Presentation.pptx
+++ b/ChaprSVN/Promo/Chap Research 2015 Kickoff Presentation.pptx
@@ -5,7 +5,7 @@
     <p:sldMasterId id="2147483648" r:id="rId1"/>
   </p:sldMasterIdLst>
   <p:notesMasterIdLst>
-    <p:notesMasterId r:id="rId18"/>
+    <p:notesMasterId r:id="rId16"/>
   </p:notesMasterIdLst>
   <p:sldIdLst>
     <p:sldId id="256" r:id="rId2"/>
@@ -16,14 +16,12 @@
     <p:sldId id="259" r:id="rId7"/>
     <p:sldId id="260" r:id="rId8"/>
     <p:sldId id="261" r:id="rId9"/>
-    <p:sldId id="270" r:id="rId10"/>
-    <p:sldId id="262" r:id="rId11"/>
-    <p:sldId id="263" r:id="rId12"/>
-    <p:sldId id="266" r:id="rId13"/>
-    <p:sldId id="267" r:id="rId14"/>
-    <p:sldId id="265" r:id="rId15"/>
-    <p:sldId id="264" r:id="rId16"/>
-    <p:sldId id="268" r:id="rId17"/>
+    <p:sldId id="263" r:id="rId10"/>
+    <p:sldId id="266" r:id="rId11"/>
+    <p:sldId id="267" r:id="rId12"/>
+    <p:sldId id="265" r:id="rId13"/>
+    <p:sldId id="264" r:id="rId14"/>
+    <p:sldId id="268" r:id="rId15"/>
   </p:sldIdLst>
   <p:sldSz cx="9144000" cy="6858000" type="screen4x3"/>
   <p:notesSz cx="6858000" cy="9144000"/>
@@ -208,7 +206,7 @@
             <a:fld id="{A64744D1-15E9-4829-BA9C-DBE2DF8AA083}" type="datetimeFigureOut">
               <a:rPr lang="en-US" smtClean="0"/>
               <a:pPr/>
-              <a:t>12/30/2014</a:t>
+              <a:t>1/14/2015</a:t>
             </a:fld>
             <a:endParaRPr lang="en-US"/>
           </a:p>
@@ -556,7 +554,7 @@
             <a:fld id="{FAC79718-4F0D-49DF-9881-C2DAABFF0B52}" type="slidenum">
               <a:rPr lang="en-US" smtClean="0"/>
               <a:pPr/>
-              <a:t>11</a:t>
+              <a:t>9</a:t>
             </a:fld>
             <a:endParaRPr lang="en-US"/>
           </a:p>
@@ -659,7 +657,7 @@
             <a:fld id="{FAC79718-4F0D-49DF-9881-C2DAABFF0B52}" type="slidenum">
               <a:rPr lang="en-US" smtClean="0"/>
               <a:pPr/>
-              <a:t>16</a:t>
+              <a:t>14</a:t>
             </a:fld>
             <a:endParaRPr lang="en-US"/>
           </a:p>
@@ -855,7 +853,7 @@
             <a:fld id="{36A0F31F-BF25-4D26-B4EF-F53A2BAF9366}" type="datetimeFigureOut">
               <a:rPr lang="en-US" smtClean="0"/>
               <a:pPr/>
-              <a:t>12/30/2014</a:t>
+              <a:t>1/14/2015</a:t>
             </a:fld>
             <a:endParaRPr lang="en-US"/>
           </a:p>
@@ -1022,7 +1020,7 @@
             <a:fld id="{36A0F31F-BF25-4D26-B4EF-F53A2BAF9366}" type="datetimeFigureOut">
               <a:rPr lang="en-US" smtClean="0"/>
               <a:pPr/>
-              <a:t>12/30/2014</a:t>
+              <a:t>1/14/2015</a:t>
             </a:fld>
             <a:endParaRPr lang="en-US"/>
           </a:p>
@@ -1199,7 +1197,7 @@
             <a:fld id="{36A0F31F-BF25-4D26-B4EF-F53A2BAF9366}" type="datetimeFigureOut">
               <a:rPr lang="en-US" smtClean="0"/>
               <a:pPr/>
-              <a:t>12/30/2014</a:t>
+              <a:t>1/14/2015</a:t>
             </a:fld>
             <a:endParaRPr lang="en-US"/>
           </a:p>
@@ -1366,7 +1364,7 @@
             <a:fld id="{36A0F31F-BF25-4D26-B4EF-F53A2BAF9366}" type="datetimeFigureOut">
               <a:rPr lang="en-US" smtClean="0"/>
               <a:pPr/>
-              <a:t>12/30/2014</a:t>
+              <a:t>1/14/2015</a:t>
             </a:fld>
             <a:endParaRPr lang="en-US"/>
           </a:p>
@@ -1609,7 +1607,7 @@
             <a:fld id="{36A0F31F-BF25-4D26-B4EF-F53A2BAF9366}" type="datetimeFigureOut">
               <a:rPr lang="en-US" smtClean="0"/>
               <a:pPr/>
-              <a:t>12/30/2014</a:t>
+              <a:t>1/14/2015</a:t>
             </a:fld>
             <a:endParaRPr lang="en-US"/>
           </a:p>
@@ -1894,7 +1892,7 @@
             <a:fld id="{36A0F31F-BF25-4D26-B4EF-F53A2BAF9366}" type="datetimeFigureOut">
               <a:rPr lang="en-US" smtClean="0"/>
               <a:pPr/>
-              <a:t>12/30/2014</a:t>
+              <a:t>1/14/2015</a:t>
             </a:fld>
             <a:endParaRPr lang="en-US"/>
           </a:p>
@@ -2313,7 +2311,7 @@
             <a:fld id="{36A0F31F-BF25-4D26-B4EF-F53A2BAF9366}" type="datetimeFigureOut">
               <a:rPr lang="en-US" smtClean="0"/>
               <a:pPr/>
-              <a:t>12/30/2014</a:t>
+              <a:t>1/14/2015</a:t>
             </a:fld>
             <a:endParaRPr lang="en-US"/>
           </a:p>
@@ -2428,7 +2426,7 @@
             <a:fld id="{36A0F31F-BF25-4D26-B4EF-F53A2BAF9366}" type="datetimeFigureOut">
               <a:rPr lang="en-US" smtClean="0"/>
               <a:pPr/>
-              <a:t>12/30/2014</a:t>
+              <a:t>1/14/2015</a:t>
             </a:fld>
             <a:endParaRPr lang="en-US"/>
           </a:p>
@@ -2520,7 +2518,7 @@
             <a:fld id="{36A0F31F-BF25-4D26-B4EF-F53A2BAF9366}" type="datetimeFigureOut">
               <a:rPr lang="en-US" smtClean="0"/>
               <a:pPr/>
-              <a:t>12/30/2014</a:t>
+              <a:t>1/14/2015</a:t>
             </a:fld>
             <a:endParaRPr lang="en-US"/>
           </a:p>
@@ -2794,7 +2792,7 @@
             <a:fld id="{36A0F31F-BF25-4D26-B4EF-F53A2BAF9366}" type="datetimeFigureOut">
               <a:rPr lang="en-US" smtClean="0"/>
               <a:pPr/>
-              <a:t>12/30/2014</a:t>
+              <a:t>1/14/2015</a:t>
             </a:fld>
             <a:endParaRPr lang="en-US"/>
           </a:p>
@@ -3044,7 +3042,7 @@
             <a:fld id="{36A0F31F-BF25-4D26-B4EF-F53A2BAF9366}" type="datetimeFigureOut">
               <a:rPr lang="en-US" smtClean="0"/>
               <a:pPr/>
-              <a:t>12/30/2014</a:t>
+              <a:t>1/14/2015</a:t>
             </a:fld>
             <a:endParaRPr lang="en-US"/>
           </a:p>
@@ -3254,7 +3252,7 @@
             <a:fld id="{36A0F31F-BF25-4D26-B4EF-F53A2BAF9366}" type="datetimeFigureOut">
               <a:rPr lang="en-US" smtClean="0"/>
               <a:pPr/>
-              <a:t>12/30/2014</a:t>
+              <a:t>1/14/2015</a:t>
             </a:fld>
             <a:endParaRPr lang="en-US"/>
           </a:p>
@@ -3709,7 +3707,7 @@
           <a:p>
             <a:r>
               <a:rPr lang="en-US" dirty="0" smtClean="0"/>
-              <a:t>Space to Meet</a:t>
+              <a:t>Resources</a:t>
             </a:r>
             <a:endParaRPr lang="en-US" dirty="0"/>
           </a:p>
@@ -3727,27 +3725,28 @@
         </p:nvSpPr>
         <p:spPr/>
         <p:txBody>
-          <a:bodyPr>
-            <a:normAutofit/>
-          </a:bodyPr>
-          <a:lstStyle/>
-          <a:p>
-            <a:r>
-              <a:rPr lang="en-US" dirty="0" smtClean="0"/>
-              <a:t>Whiteboard</a:t>
-            </a:r>
-          </a:p>
-          <a:p>
-            <a:r>
-              <a:rPr lang="en-US" dirty="0" smtClean="0"/>
-              <a:t>Chairs</a:t>
-            </a:r>
-          </a:p>
-          <a:p>
-            <a:r>
-              <a:rPr lang="en-US" dirty="0" smtClean="0"/>
-              <a:t>Shelves</a:t>
-            </a:r>
+          <a:bodyPr/>
+          <a:lstStyle/>
+          <a:p>
+            <a:r>
+              <a:rPr lang="en-US" dirty="0" smtClean="0"/>
+              <a:t>Mentors, industry experts, professors</a:t>
+            </a:r>
+          </a:p>
+          <a:p>
+            <a:pPr lvl="1"/>
+            <a:r>
+              <a:rPr lang="en-US" dirty="0" smtClean="0"/>
+              <a:t>Huge galvanizing force, but then involved as little as possible</a:t>
+            </a:r>
+          </a:p>
+          <a:p>
+            <a:pPr lvl="1"/>
+            <a:r>
+              <a:rPr lang="en-US" dirty="0" smtClean="0"/>
+              <a:t>After a student has done one project, he/she should be able to try to lead one</a:t>
+            </a:r>
+            <a:endParaRPr lang="en-US" dirty="0"/>
           </a:p>
         </p:txBody>
       </p:sp>
@@ -3793,7 +3792,7 @@
           <a:p>
             <a:r>
               <a:rPr lang="en-US" dirty="0" smtClean="0"/>
-              <a:t>Management Structure</a:t>
+              <a:t>Reflections</a:t>
             </a:r>
             <a:endParaRPr lang="en-US" dirty="0"/>
           </a:p>
@@ -3812,84 +3811,61 @@
         <p:spPr/>
         <p:txBody>
           <a:bodyPr>
-            <a:normAutofit fontScale="62500" lnSpcReduction="20000"/>
+            <a:normAutofit fontScale="85000" lnSpcReduction="20000"/>
           </a:bodyPr>
           <a:lstStyle/>
           <a:p>
             <a:r>
               <a:rPr lang="en-US" dirty="0" smtClean="0"/>
-              <a:t>Board of Directors</a:t>
+              <a:t>Always work it out on your own before trying to teach it</a:t>
             </a:r>
           </a:p>
           <a:p>
             <a:pPr lvl="1"/>
             <a:r>
               <a:rPr lang="en-US" dirty="0" smtClean="0"/>
-              <a:t>A group of teachers and mentors whom the students report to on a weekly or monthly basis</a:t>
+              <a:t>For me, that was coding the project, then starting from scratch with my student</a:t>
             </a:r>
           </a:p>
           <a:p>
             <a:pPr lvl="2"/>
             <a:r>
               <a:rPr lang="en-US" dirty="0" smtClean="0"/>
-              <a:t>Builds accountability</a:t>
-            </a:r>
-          </a:p>
-          <a:p>
-            <a:pPr lvl="2"/>
-            <a:r>
-              <a:rPr lang="en-US" dirty="0" smtClean="0"/>
-              <a:t>Gives practice presenting/selling ideas</a:t>
-            </a:r>
-          </a:p>
-          <a:p>
-            <a:r>
-              <a:rPr lang="en-US" dirty="0" smtClean="0"/>
-              <a:t>CEO/Manager</a:t>
+              <a:t>Allows you to focus on teaching and engaging, rather than solving the problem and letting your student watch</a:t>
+            </a:r>
+          </a:p>
+          <a:p>
+            <a:r>
+              <a:rPr lang="en-US" dirty="0" smtClean="0"/>
+              <a:t>Always put someone on the hook and set a date</a:t>
             </a:r>
           </a:p>
           <a:p>
             <a:pPr lvl="1"/>
             <a:r>
               <a:rPr lang="en-US" dirty="0" smtClean="0"/>
-              <a:t>One student held personally responsible for the success of the program</a:t>
-            </a:r>
-          </a:p>
-          <a:p>
-            <a:r>
-              <a:rPr lang="en-US" dirty="0" smtClean="0"/>
-              <a:t>Project Leads</a:t>
+              <a:t>Aka never let someone assume the other members of the group will get it done</a:t>
+            </a:r>
+          </a:p>
+          <a:p>
+            <a:r>
+              <a:rPr lang="en-US" dirty="0" smtClean="0"/>
+              <a:t>Document everything!!!</a:t>
             </a:r>
           </a:p>
           <a:p>
             <a:pPr lvl="1"/>
             <a:r>
               <a:rPr lang="en-US" dirty="0" smtClean="0"/>
-              <a:t>One student per project who is held responsible for the success of the project</a:t>
+              <a:t>We have been bad about this, and we constantly regret it</a:t>
             </a:r>
           </a:p>
           <a:p>
             <a:pPr lvl="1"/>
             <a:r>
               <a:rPr lang="en-US" dirty="0" smtClean="0"/>
-              <a:t>Gives brief reports on respective projects at board of directors meetings</a:t>
-            </a:r>
-          </a:p>
-          <a:p>
-            <a:r>
-              <a:rPr lang="en-US" dirty="0" smtClean="0"/>
-              <a:t>Individual Contributors</a:t>
-            </a:r>
-          </a:p>
-          <a:p>
-            <a:pPr lvl="1"/>
-            <a:r>
-              <a:rPr lang="en-US" dirty="0" smtClean="0"/>
-              <a:t>Members of individual subgroups, held responsible for meeting deadlines and small portions of their projects</a:t>
-            </a:r>
-          </a:p>
-          <a:p>
-            <a:endParaRPr lang="en-US" dirty="0"/>
+              <a:t>Put someone in charge of taking pictures, organizing notes etc.</a:t>
+            </a:r>
           </a:p>
         </p:txBody>
       </p:sp>
@@ -3935,7 +3911,7 @@
           <a:p>
             <a:r>
               <a:rPr lang="en-US" dirty="0" smtClean="0"/>
-              <a:t>Resources</a:t>
+              <a:t>Succession</a:t>
             </a:r>
             <a:endParaRPr lang="en-US" dirty="0"/>
           </a:p>
@@ -3958,21 +3934,19 @@
           <a:p>
             <a:r>
               <a:rPr lang="en-US" dirty="0" smtClean="0"/>
-              <a:t>Mentors, industry experts, professors</a:t>
-            </a:r>
-          </a:p>
-          <a:p>
-            <a:pPr lvl="1"/>
-            <a:r>
-              <a:rPr lang="en-US" dirty="0" smtClean="0"/>
-              <a:t>Huge galvanizing force, but then involved as little as possible</a:t>
-            </a:r>
-          </a:p>
-          <a:p>
-            <a:pPr lvl="1"/>
-            <a:r>
-              <a:rPr lang="en-US" dirty="0" smtClean="0"/>
-              <a:t>After a student has done one project, he/she should be able to try to lead one</a:t>
+              <a:t>4 year turnover means constantly training new members</a:t>
+            </a:r>
+          </a:p>
+          <a:p>
+            <a:r>
+              <a:rPr lang="en-US" dirty="0" smtClean="0"/>
+              <a:t>Take on projects of varying difficulty so the less experienced can learn from the beginning</a:t>
+            </a:r>
+          </a:p>
+          <a:p>
+            <a:r>
+              <a:rPr lang="en-US" dirty="0" smtClean="0"/>
+              <a:t>Have experienced members host (film and publish) training sessions on basic skills needed for a project</a:t>
             </a:r>
             <a:endParaRPr lang="en-US" dirty="0"/>
           </a:p>
@@ -4020,7 +3994,7 @@
           <a:p>
             <a:r>
               <a:rPr lang="en-US" dirty="0" smtClean="0"/>
-              <a:t>Reflections</a:t>
+              <a:t>Student Motivators</a:t>
             </a:r>
             <a:endParaRPr lang="en-US" dirty="0"/>
           </a:p>
@@ -4038,62 +4012,34 @@
         </p:nvSpPr>
         <p:spPr/>
         <p:txBody>
-          <a:bodyPr>
-            <a:normAutofit fontScale="85000" lnSpcReduction="20000"/>
-          </a:bodyPr>
-          <a:lstStyle/>
-          <a:p>
-            <a:r>
-              <a:rPr lang="en-US" dirty="0" smtClean="0"/>
-              <a:t>Always work it out on your own before trying to teach it</a:t>
-            </a:r>
-          </a:p>
-          <a:p>
-            <a:pPr lvl="1"/>
-            <a:r>
-              <a:rPr lang="en-US" dirty="0" smtClean="0"/>
-              <a:t>For me, that was coding the project, then starting from scratch with my student</a:t>
-            </a:r>
-          </a:p>
-          <a:p>
-            <a:pPr lvl="2"/>
-            <a:r>
-              <a:rPr lang="en-US" dirty="0" smtClean="0"/>
-              <a:t>Allows you to focus on teaching and engaging, rather than solving the problem and letting your student watch</a:t>
-            </a:r>
-          </a:p>
-          <a:p>
-            <a:r>
-              <a:rPr lang="en-US" dirty="0" smtClean="0"/>
-              <a:t>Always put someone on the hook and set a date</a:t>
-            </a:r>
-          </a:p>
-          <a:p>
-            <a:pPr lvl="1"/>
-            <a:r>
-              <a:rPr lang="en-US" dirty="0" smtClean="0"/>
-              <a:t>Aka never let someone assume the other members of the group will get it done</a:t>
-            </a:r>
-          </a:p>
-          <a:p>
-            <a:r>
-              <a:rPr lang="en-US" dirty="0" smtClean="0"/>
-              <a:t>Document everything!!!</a:t>
-            </a:r>
-          </a:p>
-          <a:p>
-            <a:pPr lvl="1"/>
-            <a:r>
-              <a:rPr lang="en-US" dirty="0" smtClean="0"/>
-              <a:t>We have been bad about this, and we constantly regret it</a:t>
-            </a:r>
-          </a:p>
-          <a:p>
-            <a:pPr lvl="1"/>
-            <a:r>
-              <a:rPr lang="en-US" dirty="0" smtClean="0"/>
-              <a:t>Put someone in charge of taking pictures, organizing notes etc.</a:t>
-            </a:r>
+          <a:bodyPr/>
+          <a:lstStyle/>
+          <a:p>
+            <a:r>
+              <a:rPr lang="en-US" dirty="0" smtClean="0"/>
+              <a:t>Experience not given by school curriculum</a:t>
+            </a:r>
+          </a:p>
+          <a:p>
+            <a:r>
+              <a:rPr lang="en-US" dirty="0" smtClean="0"/>
+              <a:t>Kudos from peers/mentors/community</a:t>
+            </a:r>
+          </a:p>
+          <a:p>
+            <a:r>
+              <a:rPr lang="en-US" dirty="0" smtClean="0"/>
+              <a:t>College app and resume builder</a:t>
+            </a:r>
+          </a:p>
+          <a:p>
+            <a:r>
+              <a:rPr lang="en-US" dirty="0" smtClean="0"/>
+              <a:t>Desire to see the project to completion</a:t>
+            </a:r>
+          </a:p>
+          <a:p>
+            <a:endParaRPr lang="en-US" dirty="0" smtClean="0"/>
           </a:p>
         </p:txBody>
       </p:sp>
@@ -4139,180 +4085,6 @@
           <a:p>
             <a:r>
               <a:rPr lang="en-US" dirty="0" smtClean="0"/>
-              <a:t>Succession</a:t>
-            </a:r>
-            <a:endParaRPr lang="en-US" dirty="0"/>
-          </a:p>
-        </p:txBody>
-      </p:sp>
-      <p:sp>
-        <p:nvSpPr>
-          <p:cNvPr id="3" name="Content Placeholder 2"/>
-          <p:cNvSpPr>
-            <a:spLocks noGrp="1"/>
-          </p:cNvSpPr>
-          <p:nvPr>
-            <p:ph idx="1"/>
-          </p:nvPr>
-        </p:nvSpPr>
-        <p:spPr/>
-        <p:txBody>
-          <a:bodyPr/>
-          <a:lstStyle/>
-          <a:p>
-            <a:r>
-              <a:rPr lang="en-US" dirty="0" smtClean="0"/>
-              <a:t>4 year turnover means constantly training new members</a:t>
-            </a:r>
-          </a:p>
-          <a:p>
-            <a:r>
-              <a:rPr lang="en-US" dirty="0" smtClean="0"/>
-              <a:t>Take on projects of varying difficulty so the less experienced can learn from the beginning</a:t>
-            </a:r>
-          </a:p>
-          <a:p>
-            <a:r>
-              <a:rPr lang="en-US" dirty="0" smtClean="0"/>
-              <a:t>Have experienced members host (film and publish) training sessions on basic skills needed for a project</a:t>
-            </a:r>
-            <a:endParaRPr lang="en-US" dirty="0"/>
-          </a:p>
-        </p:txBody>
-      </p:sp>
-    </p:spTree>
-  </p:cSld>
-  <p:clrMapOvr>
-    <a:masterClrMapping/>
-  </p:clrMapOvr>
-</p:sld>
-</file>
-
-<file path=ppt/slides/slide15.xml><?xml version="1.0" encoding="utf-8"?>
-<p:sld xmlns:a="http://schemas.openxmlformats.org/drawingml/2006/main" xmlns:r="http://schemas.openxmlformats.org/officeDocument/2006/relationships" xmlns:p="http://schemas.openxmlformats.org/presentationml/2006/main">
-  <p:cSld>
-    <p:spTree>
-      <p:nvGrpSpPr>
-        <p:cNvPr id="1" name=""/>
-        <p:cNvGrpSpPr/>
-        <p:nvPr/>
-      </p:nvGrpSpPr>
-      <p:grpSpPr>
-        <a:xfrm>
-          <a:off x="0" y="0"/>
-          <a:ext cx="0" cy="0"/>
-          <a:chOff x="0" y="0"/>
-          <a:chExt cx="0" cy="0"/>
-        </a:xfrm>
-      </p:grpSpPr>
-      <p:sp>
-        <p:nvSpPr>
-          <p:cNvPr id="2" name="Title 1"/>
-          <p:cNvSpPr>
-            <a:spLocks noGrp="1"/>
-          </p:cNvSpPr>
-          <p:nvPr>
-            <p:ph type="title"/>
-          </p:nvPr>
-        </p:nvSpPr>
-        <p:spPr/>
-        <p:txBody>
-          <a:bodyPr/>
-          <a:lstStyle/>
-          <a:p>
-            <a:r>
-              <a:rPr lang="en-US" dirty="0" smtClean="0"/>
-              <a:t>Student Motivators</a:t>
-            </a:r>
-            <a:endParaRPr lang="en-US" dirty="0"/>
-          </a:p>
-        </p:txBody>
-      </p:sp>
-      <p:sp>
-        <p:nvSpPr>
-          <p:cNvPr id="3" name="Content Placeholder 2"/>
-          <p:cNvSpPr>
-            <a:spLocks noGrp="1"/>
-          </p:cNvSpPr>
-          <p:nvPr>
-            <p:ph idx="1"/>
-          </p:nvPr>
-        </p:nvSpPr>
-        <p:spPr/>
-        <p:txBody>
-          <a:bodyPr/>
-          <a:lstStyle/>
-          <a:p>
-            <a:r>
-              <a:rPr lang="en-US" dirty="0" smtClean="0"/>
-              <a:t>Experience not given by school curriculum</a:t>
-            </a:r>
-          </a:p>
-          <a:p>
-            <a:r>
-              <a:rPr lang="en-US" dirty="0" smtClean="0"/>
-              <a:t>Kudos from peers/mentors/community</a:t>
-            </a:r>
-          </a:p>
-          <a:p>
-            <a:r>
-              <a:rPr lang="en-US" dirty="0" smtClean="0"/>
-              <a:t>College app and resume builder</a:t>
-            </a:r>
-          </a:p>
-          <a:p>
-            <a:r>
-              <a:rPr lang="en-US" dirty="0" smtClean="0"/>
-              <a:t>Desire to see the project to completion</a:t>
-            </a:r>
-          </a:p>
-          <a:p>
-            <a:endParaRPr lang="en-US" dirty="0" smtClean="0"/>
-          </a:p>
-        </p:txBody>
-      </p:sp>
-    </p:spTree>
-  </p:cSld>
-  <p:clrMapOvr>
-    <a:masterClrMapping/>
-  </p:clrMapOvr>
-</p:sld>
-</file>
-
-<file path=ppt/slides/slide16.xml><?xml version="1.0" encoding="utf-8"?>
-<p:sld xmlns:a="http://schemas.openxmlformats.org/drawingml/2006/main" xmlns:r="http://schemas.openxmlformats.org/officeDocument/2006/relationships" xmlns:p="http://schemas.openxmlformats.org/presentationml/2006/main">
-  <p:cSld>
-    <p:spTree>
-      <p:nvGrpSpPr>
-        <p:cNvPr id="1" name=""/>
-        <p:cNvGrpSpPr/>
-        <p:nvPr/>
-      </p:nvGrpSpPr>
-      <p:grpSpPr>
-        <a:xfrm>
-          <a:off x="0" y="0"/>
-          <a:ext cx="0" cy="0"/>
-          <a:chOff x="0" y="0"/>
-          <a:chExt cx="0" cy="0"/>
-        </a:xfrm>
-      </p:grpSpPr>
-      <p:sp>
-        <p:nvSpPr>
-          <p:cNvPr id="2" name="Title 1"/>
-          <p:cNvSpPr>
-            <a:spLocks noGrp="1"/>
-          </p:cNvSpPr>
-          <p:nvPr>
-            <p:ph type="title"/>
-          </p:nvPr>
-        </p:nvSpPr>
-        <p:spPr/>
-        <p:txBody>
-          <a:bodyPr/>
-          <a:lstStyle/>
-          <a:p>
-            <a:r>
-              <a:rPr lang="en-US" dirty="0" smtClean="0"/>
               <a:t>Contact Us</a:t>
             </a:r>
             <a:endParaRPr lang="en-US" dirty="0"/>
@@ -5080,7 +4852,11 @@
           <a:p>
             <a:r>
               <a:rPr lang="en-US" dirty="0" smtClean="0"/>
-              <a:t>The Process</a:t>
+              <a:t>Our </a:t>
+            </a:r>
+            <a:r>
+              <a:rPr lang="en-US" dirty="0" smtClean="0"/>
+              <a:t>Process</a:t>
             </a:r>
             <a:endParaRPr lang="en-US" dirty="0"/>
           </a:p>
@@ -5222,20 +4998,109 @@
             <p:ph type="title"/>
           </p:nvPr>
         </p:nvSpPr>
-        <p:spPr>
-          <a:xfrm>
-            <a:off x="457200" y="2667000"/>
-            <a:ext cx="8229600" cy="1143000"/>
-          </a:xfrm>
-        </p:spPr>
-        <p:txBody>
-          <a:bodyPr/>
-          <a:lstStyle/>
-          <a:p>
-            <a:r>
-              <a:rPr lang="en-US" dirty="0" smtClean="0"/>
-              <a:t>What It Takes</a:t>
-            </a:r>
+        <p:spPr/>
+        <p:txBody>
+          <a:bodyPr/>
+          <a:lstStyle/>
+          <a:p>
+            <a:r>
+              <a:rPr lang="en-US" dirty="0" smtClean="0"/>
+              <a:t>Management Structure</a:t>
+            </a:r>
+            <a:endParaRPr lang="en-US" dirty="0"/>
+          </a:p>
+        </p:txBody>
+      </p:sp>
+      <p:sp>
+        <p:nvSpPr>
+          <p:cNvPr id="3" name="Content Placeholder 2"/>
+          <p:cNvSpPr>
+            <a:spLocks noGrp="1"/>
+          </p:cNvSpPr>
+          <p:nvPr>
+            <p:ph idx="1"/>
+          </p:nvPr>
+        </p:nvSpPr>
+        <p:spPr/>
+        <p:txBody>
+          <a:bodyPr>
+            <a:normAutofit fontScale="62500" lnSpcReduction="20000"/>
+          </a:bodyPr>
+          <a:lstStyle/>
+          <a:p>
+            <a:r>
+              <a:rPr lang="en-US" dirty="0" smtClean="0"/>
+              <a:t>Board of Directors</a:t>
+            </a:r>
+          </a:p>
+          <a:p>
+            <a:pPr lvl="1"/>
+            <a:r>
+              <a:rPr lang="en-US" dirty="0" smtClean="0"/>
+              <a:t>A group of teachers and mentors whom the students report to on a weekly or monthly basis</a:t>
+            </a:r>
+          </a:p>
+          <a:p>
+            <a:pPr lvl="2"/>
+            <a:r>
+              <a:rPr lang="en-US" dirty="0" smtClean="0"/>
+              <a:t>Builds accountability</a:t>
+            </a:r>
+          </a:p>
+          <a:p>
+            <a:pPr lvl="2"/>
+            <a:r>
+              <a:rPr lang="en-US" dirty="0" smtClean="0"/>
+              <a:t>Gives practice presenting/selling ideas</a:t>
+            </a:r>
+          </a:p>
+          <a:p>
+            <a:r>
+              <a:rPr lang="en-US" dirty="0" smtClean="0"/>
+              <a:t>CEO/Manager</a:t>
+            </a:r>
+          </a:p>
+          <a:p>
+            <a:pPr lvl="1"/>
+            <a:r>
+              <a:rPr lang="en-US" dirty="0" smtClean="0"/>
+              <a:t>One student held personally responsible for the success of the program</a:t>
+            </a:r>
+          </a:p>
+          <a:p>
+            <a:r>
+              <a:rPr lang="en-US" dirty="0" smtClean="0"/>
+              <a:t>Project Leads</a:t>
+            </a:r>
+          </a:p>
+          <a:p>
+            <a:pPr lvl="1"/>
+            <a:r>
+              <a:rPr lang="en-US" dirty="0" smtClean="0"/>
+              <a:t>One student per project who is held responsible for the success of the project</a:t>
+            </a:r>
+          </a:p>
+          <a:p>
+            <a:pPr lvl="1"/>
+            <a:r>
+              <a:rPr lang="en-US" dirty="0" smtClean="0"/>
+              <a:t>Gives brief reports on respective projects at board of directors meetings</a:t>
+            </a:r>
+          </a:p>
+          <a:p>
+            <a:r>
+              <a:rPr lang="en-US" dirty="0" smtClean="0"/>
+              <a:t>Individual Contributors</a:t>
+            </a:r>
+          </a:p>
+          <a:p>
+            <a:pPr lvl="1"/>
+            <a:r>
+              <a:rPr lang="en-US" dirty="0" smtClean="0"/>
+              <a:t>Members of individual subgroups, held responsible for meeting deadlines and small portions of their projects</a:t>
+            </a:r>
+          </a:p>
+          <a:p>
             <a:endParaRPr lang="en-US" dirty="0"/>
           </a:p>
         </p:txBody>

</xml_diff>